<commit_message>
added TS classes example
</commit_message>
<xml_diff>
--- a/Type Script v5.0.pptx
+++ b/Type Script v5.0.pptx
@@ -23,7 +23,16 @@
     <p:sldId id="342" r:id="rId17"/>
     <p:sldId id="343" r:id="rId18"/>
     <p:sldId id="344" r:id="rId19"/>
-    <p:sldId id="268" r:id="rId20"/>
+    <p:sldId id="345" r:id="rId20"/>
+    <p:sldId id="346" r:id="rId21"/>
+    <p:sldId id="347" r:id="rId22"/>
+    <p:sldId id="348" r:id="rId23"/>
+    <p:sldId id="349" r:id="rId24"/>
+    <p:sldId id="350" r:id="rId25"/>
+    <p:sldId id="351" r:id="rId26"/>
+    <p:sldId id="352" r:id="rId27"/>
+    <p:sldId id="353" r:id="rId28"/>
+    <p:sldId id="268" r:id="rId29"/>
   </p:sldIdLst>
   <p:sldSz cx="12192000" cy="6858000"/>
   <p:notesSz cx="6858000" cy="9144000"/>
@@ -852,7 +861,7 @@
           <a:p>
             <a:fld id="{D4BA8270-C9CF-44CA-BE5A-02C2BDCCEDE4}" type="datetimeFigureOut">
               <a:rPr lang="en-GB" smtClean="0"/>
-              <a:t>14/09/2019</a:t>
+              <a:t>22/09/2019</a:t>
             </a:fld>
             <a:endParaRPr lang="en-GB"/>
           </a:p>
@@ -1103,7 +1112,7 @@
           <a:p>
             <a:fld id="{D4BA8270-C9CF-44CA-BE5A-02C2BDCCEDE4}" type="datetimeFigureOut">
               <a:rPr lang="en-GB" smtClean="0"/>
-              <a:t>14/09/2019</a:t>
+              <a:t>22/09/2019</a:t>
             </a:fld>
             <a:endParaRPr lang="en-GB"/>
           </a:p>
@@ -1417,7 +1426,7 @@
           <a:p>
             <a:fld id="{D4BA8270-C9CF-44CA-BE5A-02C2BDCCEDE4}" type="datetimeFigureOut">
               <a:rPr lang="en-GB" smtClean="0"/>
-              <a:t>14/09/2019</a:t>
+              <a:t>22/09/2019</a:t>
             </a:fld>
             <a:endParaRPr lang="en-GB"/>
           </a:p>
@@ -1758,7 +1767,7 @@
           <a:p>
             <a:fld id="{D4BA8270-C9CF-44CA-BE5A-02C2BDCCEDE4}" type="datetimeFigureOut">
               <a:rPr lang="en-GB" smtClean="0"/>
-              <a:t>14/09/2019</a:t>
+              <a:t>22/09/2019</a:t>
             </a:fld>
             <a:endParaRPr lang="en-GB"/>
           </a:p>
@@ -2072,7 +2081,7 @@
           <a:p>
             <a:fld id="{D4BA8270-C9CF-44CA-BE5A-02C2BDCCEDE4}" type="datetimeFigureOut">
               <a:rPr lang="en-GB" smtClean="0"/>
-              <a:t>14/09/2019</a:t>
+              <a:t>22/09/2019</a:t>
             </a:fld>
             <a:endParaRPr lang="en-GB"/>
           </a:p>
@@ -2465,7 +2474,7 @@
           <a:p>
             <a:fld id="{D4BA8270-C9CF-44CA-BE5A-02C2BDCCEDE4}" type="datetimeFigureOut">
               <a:rPr lang="en-GB" smtClean="0"/>
-              <a:t>14/09/2019</a:t>
+              <a:t>22/09/2019</a:t>
             </a:fld>
             <a:endParaRPr lang="en-GB"/>
           </a:p>
@@ -2635,7 +2644,7 @@
           <a:p>
             <a:fld id="{D4BA8270-C9CF-44CA-BE5A-02C2BDCCEDE4}" type="datetimeFigureOut">
               <a:rPr lang="en-GB" smtClean="0"/>
-              <a:t>14/09/2019</a:t>
+              <a:t>22/09/2019</a:t>
             </a:fld>
             <a:endParaRPr lang="en-GB"/>
           </a:p>
@@ -2815,7 +2824,7 @@
           <a:p>
             <a:fld id="{D4BA8270-C9CF-44CA-BE5A-02C2BDCCEDE4}" type="datetimeFigureOut">
               <a:rPr lang="en-GB" smtClean="0"/>
-              <a:t>14/09/2019</a:t>
+              <a:t>22/09/2019</a:t>
             </a:fld>
             <a:endParaRPr lang="en-GB"/>
           </a:p>
@@ -2991,7 +3000,7 @@
           <a:p>
             <a:fld id="{D4BA8270-C9CF-44CA-BE5A-02C2BDCCEDE4}" type="datetimeFigureOut">
               <a:rPr lang="en-GB" smtClean="0"/>
-              <a:t>14/09/2019</a:t>
+              <a:t>22/09/2019</a:t>
             </a:fld>
             <a:endParaRPr lang="en-GB"/>
           </a:p>
@@ -3238,7 +3247,7 @@
           <a:p>
             <a:fld id="{D4BA8270-C9CF-44CA-BE5A-02C2BDCCEDE4}" type="datetimeFigureOut">
               <a:rPr lang="en-GB" smtClean="0"/>
-              <a:t>14/09/2019</a:t>
+              <a:t>22/09/2019</a:t>
             </a:fld>
             <a:endParaRPr lang="en-GB"/>
           </a:p>
@@ -3470,7 +3479,7 @@
           <a:p>
             <a:fld id="{D4BA8270-C9CF-44CA-BE5A-02C2BDCCEDE4}" type="datetimeFigureOut">
               <a:rPr lang="en-GB" smtClean="0"/>
-              <a:t>14/09/2019</a:t>
+              <a:t>22/09/2019</a:t>
             </a:fld>
             <a:endParaRPr lang="en-GB"/>
           </a:p>
@@ -3844,7 +3853,7 @@
           <a:p>
             <a:fld id="{D4BA8270-C9CF-44CA-BE5A-02C2BDCCEDE4}" type="datetimeFigureOut">
               <a:rPr lang="en-GB" smtClean="0"/>
-              <a:t>14/09/2019</a:t>
+              <a:t>22/09/2019</a:t>
             </a:fld>
             <a:endParaRPr lang="en-GB"/>
           </a:p>
@@ -3967,7 +3976,7 @@
           <a:p>
             <a:fld id="{D4BA8270-C9CF-44CA-BE5A-02C2BDCCEDE4}" type="datetimeFigureOut">
               <a:rPr lang="en-GB" smtClean="0"/>
-              <a:t>14/09/2019</a:t>
+              <a:t>22/09/2019</a:t>
             </a:fld>
             <a:endParaRPr lang="en-GB"/>
           </a:p>
@@ -4062,7 +4071,7 @@
           <a:p>
             <a:fld id="{D4BA8270-C9CF-44CA-BE5A-02C2BDCCEDE4}" type="datetimeFigureOut">
               <a:rPr lang="en-GB" smtClean="0"/>
-              <a:t>14/09/2019</a:t>
+              <a:t>22/09/2019</a:t>
             </a:fld>
             <a:endParaRPr lang="en-GB"/>
           </a:p>
@@ -4317,7 +4326,7 @@
           <a:p>
             <a:fld id="{D4BA8270-C9CF-44CA-BE5A-02C2BDCCEDE4}" type="datetimeFigureOut">
               <a:rPr lang="en-GB" smtClean="0"/>
-              <a:t>14/09/2019</a:t>
+              <a:t>22/09/2019</a:t>
             </a:fld>
             <a:endParaRPr lang="en-GB"/>
           </a:p>
@@ -4580,7 +4589,7 @@
           <a:p>
             <a:fld id="{D4BA8270-C9CF-44CA-BE5A-02C2BDCCEDE4}" type="datetimeFigureOut">
               <a:rPr lang="en-GB" smtClean="0"/>
-              <a:t>14/09/2019</a:t>
+              <a:t>22/09/2019</a:t>
             </a:fld>
             <a:endParaRPr lang="en-GB"/>
           </a:p>
@@ -5323,7 +5332,7 @@
           <a:p>
             <a:fld id="{D4BA8270-C9CF-44CA-BE5A-02C2BDCCEDE4}" type="datetimeFigureOut">
               <a:rPr lang="en-GB" smtClean="0"/>
-              <a:t>14/09/2019</a:t>
+              <a:t>22/09/2019</a:t>
             </a:fld>
             <a:endParaRPr lang="en-GB"/>
           </a:p>
@@ -8241,16 +8250,23 @@
             <p:ph type="title"/>
           </p:nvPr>
         </p:nvSpPr>
-        <p:spPr/>
-        <p:txBody>
-          <a:bodyPr/>
+        <p:spPr>
+          <a:xfrm>
+            <a:off x="677334" y="609600"/>
+            <a:ext cx="8596668" cy="600433"/>
+          </a:xfrm>
+        </p:spPr>
+        <p:txBody>
+          <a:bodyPr>
+            <a:normAutofit fontScale="90000"/>
+          </a:bodyPr>
           <a:lstStyle/>
           <a:p>
             <a:r>
-              <a:rPr lang="en-GB" smtClean="0"/>
+              <a:rPr lang="en-GB" dirty="0" smtClean="0"/>
               <a:t>Classes</a:t>
             </a:r>
-            <a:endParaRPr lang="en-GB"/>
+            <a:endParaRPr lang="en-GB" dirty="0"/>
           </a:p>
         </p:txBody>
       </p:sp>
@@ -8264,18 +8280,89 @@
             <p:ph idx="1"/>
           </p:nvPr>
         </p:nvSpPr>
-        <p:spPr/>
-        <p:txBody>
-          <a:bodyPr/>
+        <p:spPr>
+          <a:xfrm>
+            <a:off x="677334" y="1210033"/>
+            <a:ext cx="8596668" cy="5500150"/>
+          </a:xfrm>
+        </p:spPr>
+        <p:txBody>
+          <a:bodyPr>
+            <a:normAutofit lnSpcReduction="10000"/>
+          </a:bodyPr>
           <a:lstStyle/>
           <a:p>
             <a:r>
               <a:rPr lang="en-GB" dirty="0" smtClean="0"/>
-              <a:t>Demo Using branch </a:t>
-            </a:r>
-            <a:r>
-              <a:rPr lang="en-GB" dirty="0"/>
-              <a:t>classes-basics</a:t>
+              <a:t>ES6 introduced the concept of classes which makes working with objects easier.</a:t>
+            </a:r>
+          </a:p>
+          <a:p>
+            <a:r>
+              <a:rPr lang="en-GB" dirty="0" smtClean="0"/>
+              <a:t>Type script also has classes and </a:t>
+            </a:r>
+            <a:r>
+              <a:rPr lang="en-GB" dirty="0" err="1" smtClean="0"/>
+              <a:t>ts</a:t>
+            </a:r>
+            <a:r>
+              <a:rPr lang="en-GB" dirty="0" smtClean="0"/>
+              <a:t> classes are more powerful than ES6 classes.</a:t>
+            </a:r>
+          </a:p>
+          <a:p>
+            <a:r>
+              <a:rPr lang="en-GB" dirty="0" smtClean="0"/>
+              <a:t>Classes are created with class keyword.</a:t>
+            </a:r>
+          </a:p>
+          <a:p>
+            <a:r>
+              <a:rPr lang="en-GB" dirty="0" smtClean="0"/>
+              <a:t>Classes have properties and properties have types. We define properties inside class body and can assign values to them inside the class itself Unlike ES6 where we have to  use this keyword and assign values only in constructor.</a:t>
+            </a:r>
+          </a:p>
+          <a:p>
+            <a:r>
+              <a:rPr lang="en-GB" dirty="0" smtClean="0"/>
+              <a:t>We can specify access modifiers like public ,private etc. for the properties .By default properties are public. Specifying access modifiers is optional. This is major difference from ES5/ES6 there is no concept of private etc. everything is public there and we have to use some hacks/logics to enforce access modifiers.</a:t>
+            </a:r>
+          </a:p>
+          <a:p>
+            <a:r>
+              <a:rPr lang="en-GB" dirty="0" smtClean="0"/>
+              <a:t>Access modifiers available are  as follows :-</a:t>
+            </a:r>
+          </a:p>
+          <a:p>
+            <a:pPr lvl="2">
+              <a:buFont typeface="Arial" panose="020B0604020202020204" pitchFamily="34" charset="0"/>
+              <a:buChar char="•"/>
+            </a:pPr>
+            <a:r>
+              <a:rPr lang="en-GB" sz="1800" dirty="0" smtClean="0"/>
+              <a:t>Public –accessible from even outside the class</a:t>
+            </a:r>
+          </a:p>
+          <a:p>
+            <a:pPr lvl="2">
+              <a:buFont typeface="Arial" panose="020B0604020202020204" pitchFamily="34" charset="0"/>
+              <a:buChar char="•"/>
+            </a:pPr>
+            <a:r>
+              <a:rPr lang="en-GB" sz="1800" dirty="0" smtClean="0"/>
+              <a:t>Private-  accessible only within the class</a:t>
+            </a:r>
+          </a:p>
+          <a:p>
+            <a:pPr lvl="2">
+              <a:buFont typeface="Arial" panose="020B0604020202020204" pitchFamily="34" charset="0"/>
+              <a:buChar char="•"/>
+            </a:pPr>
+            <a:r>
+              <a:rPr lang="en-GB" sz="1800" dirty="0" smtClean="0"/>
+              <a:t>Protected- same as private but also available via inheritance to child class.</a:t>
             </a:r>
           </a:p>
           <a:p>
@@ -8286,7 +8373,7 @@
     </p:spTree>
     <p:extLst>
       <p:ext uri="{BB962C8B-B14F-4D97-AF65-F5344CB8AC3E}">
-        <p14:creationId xmlns:p14="http://schemas.microsoft.com/office/powerpoint/2010/main" val="2155600901"/>
+        <p14:creationId xmlns:p14="http://schemas.microsoft.com/office/powerpoint/2010/main" val="2914219771"/>
       </p:ext>
     </p:extLst>
   </p:cSld>
@@ -8315,54 +8402,153 @@
       </p:grpSpPr>
       <p:sp>
         <p:nvSpPr>
-          <p:cNvPr id="3" name="Content Placeholder 2"/>
-          <p:cNvSpPr>
-            <a:spLocks noGrp="1"/>
-          </p:cNvSpPr>
-          <p:nvPr>
-            <p:ph idx="1"/>
+          <p:cNvPr id="2" name="Title 1"/>
+          <p:cNvSpPr>
+            <a:spLocks noGrp="1"/>
+          </p:cNvSpPr>
+          <p:nvPr>
+            <p:ph type="title"/>
           </p:nvPr>
         </p:nvSpPr>
         <p:spPr>
           <a:xfrm>
-            <a:off x="3163860" y="2754147"/>
-            <a:ext cx="8596668" cy="3880773"/>
+            <a:off x="615457" y="142088"/>
+            <a:ext cx="8596668" cy="717311"/>
           </a:xfrm>
         </p:spPr>
         <p:txBody>
-          <a:bodyPr>
-            <a:normAutofit/>
-          </a:bodyPr>
+          <a:bodyPr/>
           <a:lstStyle/>
           <a:p>
-            <a:pPr marL="0" indent="0">
-              <a:buNone/>
-            </a:pPr>
-            <a:r>
-              <a:rPr lang="en-IN" sz="5400" b="1" smtClean="0"/>
-              <a:t>Thanks!!!!!</a:t>
-            </a:r>
-            <a:endParaRPr lang="en-GB" sz="5400" b="1" dirty="0"/>
-          </a:p>
-        </p:txBody>
-      </p:sp>
+            <a:r>
+              <a:rPr lang="en-GB" dirty="0" smtClean="0"/>
+              <a:t>Classes Continued…</a:t>
+            </a:r>
+            <a:endParaRPr lang="en-GB" dirty="0"/>
+          </a:p>
+        </p:txBody>
+      </p:sp>
+      <p:sp>
+        <p:nvSpPr>
+          <p:cNvPr id="3" name="Content Placeholder 2"/>
+          <p:cNvSpPr>
+            <a:spLocks noGrp="1"/>
+          </p:cNvSpPr>
+          <p:nvPr>
+            <p:ph idx="1"/>
+          </p:nvPr>
+        </p:nvSpPr>
+        <p:spPr>
+          <a:xfrm>
+            <a:off x="677333" y="859399"/>
+            <a:ext cx="9257313" cy="5424523"/>
+          </a:xfrm>
+        </p:spPr>
+        <p:txBody>
+          <a:bodyPr/>
+          <a:lstStyle/>
+          <a:p>
+            <a:r>
+              <a:rPr lang="en-GB" sz="1400" dirty="0" smtClean="0">
+                <a:latin typeface="Verdana" panose="020B0604030504040204" pitchFamily="34" charset="0"/>
+                <a:ea typeface="Verdana" panose="020B0604030504040204" pitchFamily="34" charset="0"/>
+              </a:rPr>
+              <a:t>We can also  provide a constructor to the class and use </a:t>
+            </a:r>
+            <a:r>
+              <a:rPr lang="en-GB" sz="1400" b="1" i="1" dirty="0" smtClean="0">
+                <a:latin typeface="Verdana" panose="020B0604030504040204" pitchFamily="34" charset="0"/>
+                <a:ea typeface="Verdana" panose="020B0604030504040204" pitchFamily="34" charset="0"/>
+              </a:rPr>
+              <a:t>this</a:t>
+            </a:r>
+            <a:r>
+              <a:rPr lang="en-GB" sz="1400" dirty="0" smtClean="0">
+                <a:latin typeface="Verdana" panose="020B0604030504040204" pitchFamily="34" charset="0"/>
+                <a:ea typeface="Verdana" panose="020B0604030504040204" pitchFamily="34" charset="0"/>
+              </a:rPr>
+              <a:t> keyword to assign values.</a:t>
+            </a:r>
+          </a:p>
+          <a:p>
+            <a:r>
+              <a:rPr lang="en-GB" sz="1400" dirty="0" smtClean="0">
+                <a:latin typeface="Verdana" panose="020B0604030504040204" pitchFamily="34" charset="0"/>
+                <a:ea typeface="Verdana" panose="020B0604030504040204" pitchFamily="34" charset="0"/>
+              </a:rPr>
+              <a:t>We can also declare properties directly inside method parameters </a:t>
+            </a:r>
+            <a:r>
+              <a:rPr lang="en-GB" sz="1400" dirty="0">
+                <a:latin typeface="Verdana" panose="020B0604030504040204" pitchFamily="34" charset="0"/>
+                <a:ea typeface="Verdana" panose="020B0604030504040204" pitchFamily="34" charset="0"/>
+              </a:rPr>
+              <a:t>in the constructor</a:t>
+            </a:r>
+            <a:r>
+              <a:rPr lang="en-GB" sz="1400" dirty="0" smtClean="0">
+                <a:latin typeface="Verdana" panose="020B0604030504040204" pitchFamily="34" charset="0"/>
+                <a:ea typeface="Verdana" panose="020B0604030504040204" pitchFamily="34" charset="0"/>
+              </a:rPr>
+              <a:t> instead of declaring it in class body and TS is smart enough to understand that it first needs to create such a property in class and then assign value to it. We just have to add the access modifier for such a property in the constructor parameters to achieve this. In such cases we don’t even need to use this keyword to assign value passed to the constructor, to the field, we just declare it as a parameter to the constructor method along with the access specifier.</a:t>
+            </a:r>
+          </a:p>
+          <a:p>
+            <a:r>
+              <a:rPr lang="en-GB" sz="1400" dirty="0">
+                <a:latin typeface="Verdana" panose="020B0604030504040204" pitchFamily="34" charset="0"/>
+                <a:ea typeface="Verdana" panose="020B0604030504040204" pitchFamily="34" charset="0"/>
+              </a:rPr>
+              <a:t>To use the class we need to instantiate </a:t>
+            </a:r>
+            <a:r>
+              <a:rPr lang="en-GB" sz="1400" dirty="0" smtClean="0">
+                <a:latin typeface="Verdana" panose="020B0604030504040204" pitchFamily="34" charset="0"/>
+                <a:ea typeface="Verdana" panose="020B0604030504040204" pitchFamily="34" charset="0"/>
+              </a:rPr>
+              <a:t>it i.e. make an object using new keyword and store its reference in a variable. We have to pass arguments expected by the constructor.</a:t>
+            </a:r>
+            <a:endParaRPr lang="en-GB" sz="1400" dirty="0">
+              <a:latin typeface="Verdana" panose="020B0604030504040204" pitchFamily="34" charset="0"/>
+              <a:ea typeface="Verdana" panose="020B0604030504040204" pitchFamily="34" charset="0"/>
+            </a:endParaRPr>
+          </a:p>
+        </p:txBody>
+      </p:sp>
+      <p:pic>
+        <p:nvPicPr>
+          <p:cNvPr id="4" name="Picture 3"/>
+          <p:cNvPicPr>
+            <a:picLocks noChangeAspect="1"/>
+          </p:cNvPicPr>
+          <p:nvPr/>
+        </p:nvPicPr>
+        <p:blipFill>
+          <a:blip r:embed="rId2"/>
+          <a:stretch>
+            <a:fillRect/>
+          </a:stretch>
+        </p:blipFill>
+        <p:spPr>
+          <a:xfrm>
+            <a:off x="941901" y="3272589"/>
+            <a:ext cx="8779615" cy="2768773"/>
+          </a:xfrm>
+          <a:prstGeom prst="rect">
+            <a:avLst/>
+          </a:prstGeom>
+        </p:spPr>
+      </p:pic>
     </p:spTree>
     <p:extLst>
       <p:ext uri="{BB962C8B-B14F-4D97-AF65-F5344CB8AC3E}">
-        <p14:creationId xmlns:p14="http://schemas.microsoft.com/office/powerpoint/2010/main" val="3977684842"/>
+        <p14:creationId xmlns:p14="http://schemas.microsoft.com/office/powerpoint/2010/main" val="2911868659"/>
       </p:ext>
     </p:extLst>
   </p:cSld>
   <p:clrMapOvr>
     <a:masterClrMapping/>
   </p:clrMapOvr>
-  <p:timing>
-    <p:tnLst>
-      <p:par>
-        <p:cTn id="1" dur="indefinite" restart="never" nodeType="tmRoot"/>
-      </p:par>
-    </p:tnLst>
-  </p:timing>
 </p:sld>
 </file>
 
@@ -8415,6 +8601,1180 @@
     <p:extLst>
       <p:ext uri="{BB962C8B-B14F-4D97-AF65-F5344CB8AC3E}">
         <p14:creationId xmlns:p14="http://schemas.microsoft.com/office/powerpoint/2010/main" val="2515153961"/>
+      </p:ext>
+    </p:extLst>
+  </p:cSld>
+  <p:clrMapOvr>
+    <a:masterClrMapping/>
+  </p:clrMapOvr>
+  <p:timing>
+    <p:tnLst>
+      <p:par>
+        <p:cTn id="1" dur="indefinite" restart="never" nodeType="tmRoot"/>
+      </p:par>
+    </p:tnLst>
+  </p:timing>
+</p:sld>
+</file>
+
+<file path=ppt/slides/slide20.xml><?xml version="1.0" encoding="utf-8"?>
+<p:sld xmlns:a="http://schemas.openxmlformats.org/drawingml/2006/main" xmlns:r="http://schemas.openxmlformats.org/officeDocument/2006/relationships" xmlns:p="http://schemas.openxmlformats.org/presentationml/2006/main">
+  <p:cSld>
+    <p:spTree>
+      <p:nvGrpSpPr>
+        <p:cNvPr id="1" name=""/>
+        <p:cNvGrpSpPr/>
+        <p:nvPr/>
+      </p:nvGrpSpPr>
+      <p:grpSpPr>
+        <a:xfrm>
+          <a:off x="0" y="0"/>
+          <a:ext cx="0" cy="0"/>
+          <a:chOff x="0" y="0"/>
+          <a:chExt cx="0" cy="0"/>
+        </a:xfrm>
+      </p:grpSpPr>
+      <p:sp>
+        <p:nvSpPr>
+          <p:cNvPr id="2" name="Title 1"/>
+          <p:cNvSpPr>
+            <a:spLocks noGrp="1"/>
+          </p:cNvSpPr>
+          <p:nvPr>
+            <p:ph type="title"/>
+          </p:nvPr>
+        </p:nvSpPr>
+        <p:spPr>
+          <a:xfrm>
+            <a:off x="347325" y="59585"/>
+            <a:ext cx="8596668" cy="648559"/>
+          </a:xfrm>
+        </p:spPr>
+        <p:txBody>
+          <a:bodyPr/>
+          <a:lstStyle/>
+          <a:p>
+            <a:r>
+              <a:rPr lang="en-IN" dirty="0" smtClean="0"/>
+              <a:t>Class Methods</a:t>
+            </a:r>
+            <a:endParaRPr lang="en-GB" dirty="0"/>
+          </a:p>
+        </p:txBody>
+      </p:sp>
+      <p:sp>
+        <p:nvSpPr>
+          <p:cNvPr id="3" name="Content Placeholder 2"/>
+          <p:cNvSpPr>
+            <a:spLocks noGrp="1"/>
+          </p:cNvSpPr>
+          <p:nvPr>
+            <p:ph idx="1"/>
+          </p:nvPr>
+        </p:nvSpPr>
+        <p:spPr>
+          <a:xfrm>
+            <a:off x="677334" y="708145"/>
+            <a:ext cx="8596668" cy="5333218"/>
+          </a:xfrm>
+        </p:spPr>
+        <p:txBody>
+          <a:bodyPr/>
+          <a:lstStyle/>
+          <a:p>
+            <a:r>
+              <a:rPr lang="en-IN" dirty="0" smtClean="0"/>
+              <a:t>We can create methods in classes same way we create a function but without using the function keyword.</a:t>
+            </a:r>
+          </a:p>
+          <a:p>
+            <a:r>
+              <a:rPr lang="en-IN" dirty="0" smtClean="0"/>
+              <a:t>Methods can also have an  access specifier. We can access private/protected properties also since methods are declared inside the class and are thus part of it.</a:t>
+            </a:r>
+          </a:p>
+          <a:p>
+            <a:r>
+              <a:rPr lang="en-IN" dirty="0" smtClean="0"/>
+              <a:t>When we want to access properties or modify the values of properties </a:t>
+            </a:r>
+            <a:r>
+              <a:rPr lang="en-IN" dirty="0"/>
+              <a:t>inside methods/constructor </a:t>
+            </a:r>
+            <a:r>
+              <a:rPr lang="en-IN" dirty="0" smtClean="0"/>
+              <a:t>we need to use this keyword.</a:t>
+            </a:r>
+            <a:endParaRPr lang="en-GB" dirty="0"/>
+          </a:p>
+        </p:txBody>
+      </p:sp>
+    </p:spTree>
+    <p:extLst>
+      <p:ext uri="{BB962C8B-B14F-4D97-AF65-F5344CB8AC3E}">
+        <p14:creationId xmlns:p14="http://schemas.microsoft.com/office/powerpoint/2010/main" val="566858799"/>
+      </p:ext>
+    </p:extLst>
+  </p:cSld>
+  <p:clrMapOvr>
+    <a:masterClrMapping/>
+  </p:clrMapOvr>
+</p:sld>
+</file>
+
+<file path=ppt/slides/slide21.xml><?xml version="1.0" encoding="utf-8"?>
+<p:sld xmlns:a="http://schemas.openxmlformats.org/drawingml/2006/main" xmlns:r="http://schemas.openxmlformats.org/officeDocument/2006/relationships" xmlns:p="http://schemas.openxmlformats.org/presentationml/2006/main">
+  <p:cSld>
+    <p:spTree>
+      <p:nvGrpSpPr>
+        <p:cNvPr id="1" name=""/>
+        <p:cNvGrpSpPr/>
+        <p:nvPr/>
+      </p:nvGrpSpPr>
+      <p:grpSpPr>
+        <a:xfrm>
+          <a:off x="0" y="0"/>
+          <a:ext cx="0" cy="0"/>
+          <a:chOff x="0" y="0"/>
+          <a:chExt cx="0" cy="0"/>
+        </a:xfrm>
+      </p:grpSpPr>
+      <p:sp>
+        <p:nvSpPr>
+          <p:cNvPr id="2" name="Title 1"/>
+          <p:cNvSpPr>
+            <a:spLocks noGrp="1"/>
+          </p:cNvSpPr>
+          <p:nvPr>
+            <p:ph type="title"/>
+          </p:nvPr>
+        </p:nvSpPr>
+        <p:spPr>
+          <a:xfrm>
+            <a:off x="677334" y="176463"/>
+            <a:ext cx="8596668" cy="634809"/>
+          </a:xfrm>
+        </p:spPr>
+        <p:txBody>
+          <a:bodyPr>
+            <a:normAutofit fontScale="90000"/>
+          </a:bodyPr>
+          <a:lstStyle/>
+          <a:p>
+            <a:r>
+              <a:rPr lang="en-IN" dirty="0" smtClean="0"/>
+              <a:t>Inheritance</a:t>
+            </a:r>
+            <a:endParaRPr lang="en-GB" dirty="0"/>
+          </a:p>
+        </p:txBody>
+      </p:sp>
+      <p:sp>
+        <p:nvSpPr>
+          <p:cNvPr id="3" name="Content Placeholder 2"/>
+          <p:cNvSpPr>
+            <a:spLocks noGrp="1"/>
+          </p:cNvSpPr>
+          <p:nvPr>
+            <p:ph idx="1"/>
+          </p:nvPr>
+        </p:nvSpPr>
+        <p:spPr>
+          <a:xfrm>
+            <a:off x="677334" y="756271"/>
+            <a:ext cx="8596668" cy="5397022"/>
+          </a:xfrm>
+        </p:spPr>
+        <p:txBody>
+          <a:bodyPr/>
+          <a:lstStyle/>
+          <a:p>
+            <a:r>
+              <a:rPr lang="en-IN" dirty="0" smtClean="0"/>
+              <a:t>Type Script offers us the feature to extend classes to achieve inheritance.</a:t>
+            </a:r>
+          </a:p>
+          <a:p>
+            <a:r>
+              <a:rPr lang="en-IN" dirty="0" smtClean="0"/>
+              <a:t>To inherit a class we use the extends keyword.</a:t>
+            </a:r>
+          </a:p>
+          <a:p>
+            <a:r>
+              <a:rPr lang="en-IN" dirty="0" smtClean="0"/>
+              <a:t>Whatever we specify in the child class gets either appended if it was not in parent class or gets overridden if it was already present in parent class.</a:t>
+            </a:r>
+          </a:p>
+          <a:p>
+            <a:r>
+              <a:rPr lang="en-IN" dirty="0" smtClean="0"/>
+              <a:t>Private properties and methods are not available in child class. </a:t>
+            </a:r>
+          </a:p>
+          <a:p>
+            <a:endParaRPr lang="en-GB" dirty="0"/>
+          </a:p>
+        </p:txBody>
+      </p:sp>
+      <p:pic>
+        <p:nvPicPr>
+          <p:cNvPr id="4" name="Picture 3"/>
+          <p:cNvPicPr>
+            <a:picLocks noChangeAspect="1"/>
+          </p:cNvPicPr>
+          <p:nvPr/>
+        </p:nvPicPr>
+        <p:blipFill>
+          <a:blip r:embed="rId2"/>
+          <a:stretch>
+            <a:fillRect/>
+          </a:stretch>
+        </p:blipFill>
+        <p:spPr>
+          <a:xfrm>
+            <a:off x="1077220" y="2608059"/>
+            <a:ext cx="7576887" cy="3497107"/>
+          </a:xfrm>
+          <a:prstGeom prst="rect">
+            <a:avLst/>
+          </a:prstGeom>
+        </p:spPr>
+      </p:pic>
+    </p:spTree>
+    <p:extLst>
+      <p:ext uri="{BB962C8B-B14F-4D97-AF65-F5344CB8AC3E}">
+        <p14:creationId xmlns:p14="http://schemas.microsoft.com/office/powerpoint/2010/main" val="1925306523"/>
+      </p:ext>
+    </p:extLst>
+  </p:cSld>
+  <p:clrMapOvr>
+    <a:masterClrMapping/>
+  </p:clrMapOvr>
+</p:sld>
+</file>
+
+<file path=ppt/slides/slide22.xml><?xml version="1.0" encoding="utf-8"?>
+<p:sld xmlns:a="http://schemas.openxmlformats.org/drawingml/2006/main" xmlns:r="http://schemas.openxmlformats.org/officeDocument/2006/relationships" xmlns:p="http://schemas.openxmlformats.org/presentationml/2006/main">
+  <p:cSld>
+    <p:spTree>
+      <p:nvGrpSpPr>
+        <p:cNvPr id="1" name=""/>
+        <p:cNvGrpSpPr/>
+        <p:nvPr/>
+      </p:nvGrpSpPr>
+      <p:grpSpPr>
+        <a:xfrm>
+          <a:off x="0" y="0"/>
+          <a:ext cx="0" cy="0"/>
+          <a:chOff x="0" y="0"/>
+          <a:chExt cx="0" cy="0"/>
+        </a:xfrm>
+      </p:grpSpPr>
+      <p:sp>
+        <p:nvSpPr>
+          <p:cNvPr id="2" name="Title 1"/>
+          <p:cNvSpPr>
+            <a:spLocks noGrp="1"/>
+          </p:cNvSpPr>
+          <p:nvPr>
+            <p:ph type="title"/>
+          </p:nvPr>
+        </p:nvSpPr>
+        <p:spPr>
+          <a:xfrm>
+            <a:off x="539830" y="155837"/>
+            <a:ext cx="8596668" cy="641684"/>
+          </a:xfrm>
+        </p:spPr>
+        <p:txBody>
+          <a:bodyPr/>
+          <a:lstStyle/>
+          <a:p>
+            <a:r>
+              <a:rPr lang="en-IN" dirty="0" smtClean="0"/>
+              <a:t>Inheritance And Constructors</a:t>
+            </a:r>
+            <a:endParaRPr lang="en-GB" dirty="0"/>
+          </a:p>
+        </p:txBody>
+      </p:sp>
+      <p:sp>
+        <p:nvSpPr>
+          <p:cNvPr id="3" name="Content Placeholder 2"/>
+          <p:cNvSpPr>
+            <a:spLocks noGrp="1"/>
+          </p:cNvSpPr>
+          <p:nvPr>
+            <p:ph idx="1"/>
+          </p:nvPr>
+        </p:nvSpPr>
+        <p:spPr>
+          <a:xfrm>
+            <a:off x="677334" y="797521"/>
+            <a:ext cx="8596668" cy="5243841"/>
+          </a:xfrm>
+        </p:spPr>
+        <p:txBody>
+          <a:bodyPr/>
+          <a:lstStyle/>
+          <a:p>
+            <a:r>
+              <a:rPr lang="en-IN" dirty="0" smtClean="0"/>
+              <a:t>If we don’t define a constructor in child class the parent constructor is still implicitly called ,but if we do define a constructor we explicitly need to call the parent constructor using super keyword.</a:t>
+            </a:r>
+            <a:endParaRPr lang="en-GB" dirty="0"/>
+          </a:p>
+        </p:txBody>
+      </p:sp>
+      <p:pic>
+        <p:nvPicPr>
+          <p:cNvPr id="4" name="Picture 3"/>
+          <p:cNvPicPr>
+            <a:picLocks noChangeAspect="1"/>
+          </p:cNvPicPr>
+          <p:nvPr/>
+        </p:nvPicPr>
+        <p:blipFill>
+          <a:blip r:embed="rId2"/>
+          <a:stretch>
+            <a:fillRect/>
+          </a:stretch>
+        </p:blipFill>
+        <p:spPr>
+          <a:xfrm>
+            <a:off x="1346033" y="1695127"/>
+            <a:ext cx="7041696" cy="4733174"/>
+          </a:xfrm>
+          <a:prstGeom prst="rect">
+            <a:avLst/>
+          </a:prstGeom>
+        </p:spPr>
+      </p:pic>
+    </p:spTree>
+    <p:extLst>
+      <p:ext uri="{BB962C8B-B14F-4D97-AF65-F5344CB8AC3E}">
+        <p14:creationId xmlns:p14="http://schemas.microsoft.com/office/powerpoint/2010/main" val="4051330749"/>
+      </p:ext>
+    </p:extLst>
+  </p:cSld>
+  <p:clrMapOvr>
+    <a:masterClrMapping/>
+  </p:clrMapOvr>
+</p:sld>
+</file>
+
+<file path=ppt/slides/slide23.xml><?xml version="1.0" encoding="utf-8"?>
+<p:sld xmlns:a="http://schemas.openxmlformats.org/drawingml/2006/main" xmlns:r="http://schemas.openxmlformats.org/officeDocument/2006/relationships" xmlns:p="http://schemas.openxmlformats.org/presentationml/2006/main">
+  <p:cSld>
+    <p:spTree>
+      <p:nvGrpSpPr>
+        <p:cNvPr id="1" name=""/>
+        <p:cNvGrpSpPr/>
+        <p:nvPr/>
+      </p:nvGrpSpPr>
+      <p:grpSpPr>
+        <a:xfrm>
+          <a:off x="0" y="0"/>
+          <a:ext cx="0" cy="0"/>
+          <a:chOff x="0" y="0"/>
+          <a:chExt cx="0" cy="0"/>
+        </a:xfrm>
+      </p:grpSpPr>
+      <p:sp>
+        <p:nvSpPr>
+          <p:cNvPr id="2" name="Title 1"/>
+          <p:cNvSpPr>
+            <a:spLocks noGrp="1"/>
+          </p:cNvSpPr>
+          <p:nvPr>
+            <p:ph type="title"/>
+          </p:nvPr>
+        </p:nvSpPr>
+        <p:spPr>
+          <a:xfrm>
+            <a:off x="340450" y="114587"/>
+            <a:ext cx="8596668" cy="641684"/>
+          </a:xfrm>
+        </p:spPr>
+        <p:txBody>
+          <a:bodyPr/>
+          <a:lstStyle/>
+          <a:p>
+            <a:r>
+              <a:rPr lang="en-IN" dirty="0" smtClean="0"/>
+              <a:t>Getters and Setters</a:t>
+            </a:r>
+            <a:endParaRPr lang="en-GB" dirty="0"/>
+          </a:p>
+        </p:txBody>
+      </p:sp>
+      <p:sp>
+        <p:nvSpPr>
+          <p:cNvPr id="3" name="Content Placeholder 2"/>
+          <p:cNvSpPr>
+            <a:spLocks noGrp="1"/>
+          </p:cNvSpPr>
+          <p:nvPr>
+            <p:ph idx="1"/>
+          </p:nvPr>
+        </p:nvSpPr>
+        <p:spPr>
+          <a:xfrm>
+            <a:off x="677334" y="756271"/>
+            <a:ext cx="8596668" cy="5981413"/>
+          </a:xfrm>
+        </p:spPr>
+        <p:txBody>
+          <a:bodyPr>
+            <a:normAutofit/>
+          </a:bodyPr>
+          <a:lstStyle/>
+          <a:p>
+            <a:r>
+              <a:rPr lang="en-IN" sz="1400" dirty="0" smtClean="0">
+                <a:latin typeface="Verdana" panose="020B0604030504040204" pitchFamily="34" charset="0"/>
+                <a:ea typeface="Verdana" panose="020B0604030504040204" pitchFamily="34" charset="0"/>
+              </a:rPr>
+              <a:t>In TS getters and setters are exposed as properties not like methods.</a:t>
+            </a:r>
+          </a:p>
+          <a:p>
+            <a:r>
+              <a:rPr lang="en-IN" sz="1400" dirty="0" smtClean="0">
+                <a:latin typeface="Verdana" panose="020B0604030504040204" pitchFamily="34" charset="0"/>
+                <a:ea typeface="Verdana" panose="020B0604030504040204" pitchFamily="34" charset="0"/>
+              </a:rPr>
+              <a:t>We use the get keyword to create a getter and set keyword to create a setter.</a:t>
+            </a:r>
+          </a:p>
+          <a:p>
+            <a:r>
+              <a:rPr lang="en-IN" sz="1400" dirty="0" smtClean="0">
+                <a:latin typeface="Verdana" panose="020B0604030504040204" pitchFamily="34" charset="0"/>
+                <a:ea typeface="Verdana" panose="020B0604030504040204" pitchFamily="34" charset="0"/>
+              </a:rPr>
+              <a:t>We can add any logic to a getter or setter the same way we add it to a method.</a:t>
+            </a:r>
+          </a:p>
+          <a:p>
+            <a:r>
+              <a:rPr lang="en-IN" sz="1400" dirty="0" smtClean="0">
+                <a:latin typeface="Verdana" panose="020B0604030504040204" pitchFamily="34" charset="0"/>
+                <a:ea typeface="Verdana" panose="020B0604030504040204" pitchFamily="34" charset="0"/>
+              </a:rPr>
+              <a:t>Setters take in an argument but getters don’t. Setters cant return a value but getters must always return a value.</a:t>
+            </a:r>
+            <a:endParaRPr lang="en-GB" sz="1400" dirty="0">
+              <a:latin typeface="Verdana" panose="020B0604030504040204" pitchFamily="34" charset="0"/>
+              <a:ea typeface="Verdana" panose="020B0604030504040204" pitchFamily="34" charset="0"/>
+            </a:endParaRPr>
+          </a:p>
+        </p:txBody>
+      </p:sp>
+      <p:pic>
+        <p:nvPicPr>
+          <p:cNvPr id="4" name="Picture 3"/>
+          <p:cNvPicPr>
+            <a:picLocks noChangeAspect="1"/>
+          </p:cNvPicPr>
+          <p:nvPr/>
+        </p:nvPicPr>
+        <p:blipFill>
+          <a:blip r:embed="rId2"/>
+          <a:stretch>
+            <a:fillRect/>
+          </a:stretch>
+        </p:blipFill>
+        <p:spPr>
+          <a:xfrm>
+            <a:off x="1010654" y="2306924"/>
+            <a:ext cx="8078344" cy="4121376"/>
+          </a:xfrm>
+          <a:prstGeom prst="rect">
+            <a:avLst/>
+          </a:prstGeom>
+        </p:spPr>
+      </p:pic>
+    </p:spTree>
+    <p:extLst>
+      <p:ext uri="{BB962C8B-B14F-4D97-AF65-F5344CB8AC3E}">
+        <p14:creationId xmlns:p14="http://schemas.microsoft.com/office/powerpoint/2010/main" val="1549906328"/>
+      </p:ext>
+    </p:extLst>
+  </p:cSld>
+  <p:clrMapOvr>
+    <a:masterClrMapping/>
+  </p:clrMapOvr>
+</p:sld>
+</file>
+
+<file path=ppt/slides/slide24.xml><?xml version="1.0" encoding="utf-8"?>
+<p:sld xmlns:a="http://schemas.openxmlformats.org/drawingml/2006/main" xmlns:r="http://schemas.openxmlformats.org/officeDocument/2006/relationships" xmlns:p="http://schemas.openxmlformats.org/presentationml/2006/main">
+  <p:cSld>
+    <p:spTree>
+      <p:nvGrpSpPr>
+        <p:cNvPr id="1" name=""/>
+        <p:cNvGrpSpPr/>
+        <p:nvPr/>
+      </p:nvGrpSpPr>
+      <p:grpSpPr>
+        <a:xfrm>
+          <a:off x="0" y="0"/>
+          <a:ext cx="0" cy="0"/>
+          <a:chOff x="0" y="0"/>
+          <a:chExt cx="0" cy="0"/>
+        </a:xfrm>
+      </p:grpSpPr>
+      <p:sp>
+        <p:nvSpPr>
+          <p:cNvPr id="2" name="Title 1"/>
+          <p:cNvSpPr>
+            <a:spLocks noGrp="1"/>
+          </p:cNvSpPr>
+          <p:nvPr>
+            <p:ph type="title"/>
+          </p:nvPr>
+        </p:nvSpPr>
+        <p:spPr>
+          <a:xfrm>
+            <a:off x="79193" y="59585"/>
+            <a:ext cx="8596668" cy="545432"/>
+          </a:xfrm>
+        </p:spPr>
+        <p:txBody>
+          <a:bodyPr>
+            <a:normAutofit fontScale="90000"/>
+          </a:bodyPr>
+          <a:lstStyle/>
+          <a:p>
+            <a:r>
+              <a:rPr lang="en-GB" dirty="0" smtClean="0"/>
+              <a:t>Static</a:t>
+            </a:r>
+            <a:r>
+              <a:rPr lang="en-GB" dirty="0"/>
+              <a:t> properties and methods</a:t>
+            </a:r>
+            <a:br>
+              <a:rPr lang="en-GB" dirty="0"/>
+            </a:br>
+            <a:endParaRPr lang="en-GB" dirty="0"/>
+          </a:p>
+        </p:txBody>
+      </p:sp>
+      <p:sp>
+        <p:nvSpPr>
+          <p:cNvPr id="3" name="Content Placeholder 2"/>
+          <p:cNvSpPr>
+            <a:spLocks noGrp="1"/>
+          </p:cNvSpPr>
+          <p:nvPr>
+            <p:ph idx="1"/>
+          </p:nvPr>
+        </p:nvSpPr>
+        <p:spPr>
+          <a:xfrm>
+            <a:off x="426261" y="660019"/>
+            <a:ext cx="9419007" cy="5905786"/>
+          </a:xfrm>
+        </p:spPr>
+        <p:txBody>
+          <a:bodyPr/>
+          <a:lstStyle/>
+          <a:p>
+            <a:r>
+              <a:rPr lang="en-IN" dirty="0" smtClean="0"/>
+              <a:t>Static properties/Methods can be accessed from outside the class without the need to instantiate the class.</a:t>
+            </a:r>
+          </a:p>
+          <a:p>
+            <a:r>
+              <a:rPr lang="en-IN" dirty="0" smtClean="0"/>
+              <a:t>Helper/Utility classes are a good example where static </a:t>
+            </a:r>
+            <a:r>
+              <a:rPr lang="en-IN" dirty="0"/>
+              <a:t>properties/Methods can </a:t>
+            </a:r>
+            <a:r>
+              <a:rPr lang="en-IN" dirty="0" smtClean="0"/>
+              <a:t> be used.</a:t>
+            </a:r>
+          </a:p>
+          <a:p>
+            <a:r>
+              <a:rPr lang="en-IN" dirty="0" smtClean="0"/>
+              <a:t>To create a static property/method we use static keyword.</a:t>
+            </a:r>
+          </a:p>
+          <a:p>
+            <a:endParaRPr lang="en-GB" dirty="0"/>
+          </a:p>
+        </p:txBody>
+      </p:sp>
+      <p:pic>
+        <p:nvPicPr>
+          <p:cNvPr id="4" name="Picture 3"/>
+          <p:cNvPicPr>
+            <a:picLocks noChangeAspect="1"/>
+          </p:cNvPicPr>
+          <p:nvPr/>
+        </p:nvPicPr>
+        <p:blipFill>
+          <a:blip r:embed="rId2"/>
+          <a:stretch>
+            <a:fillRect/>
+          </a:stretch>
+        </p:blipFill>
+        <p:spPr>
+          <a:xfrm>
+            <a:off x="545074" y="2629652"/>
+            <a:ext cx="9163050" cy="3757398"/>
+          </a:xfrm>
+          <a:prstGeom prst="rect">
+            <a:avLst/>
+          </a:prstGeom>
+        </p:spPr>
+      </p:pic>
+    </p:spTree>
+    <p:extLst>
+      <p:ext uri="{BB962C8B-B14F-4D97-AF65-F5344CB8AC3E}">
+        <p14:creationId xmlns:p14="http://schemas.microsoft.com/office/powerpoint/2010/main" val="3699755456"/>
+      </p:ext>
+    </p:extLst>
+  </p:cSld>
+  <p:clrMapOvr>
+    <a:masterClrMapping/>
+  </p:clrMapOvr>
+</p:sld>
+</file>
+
+<file path=ppt/slides/slide25.xml><?xml version="1.0" encoding="utf-8"?>
+<p:sld xmlns:a="http://schemas.openxmlformats.org/drawingml/2006/main" xmlns:r="http://schemas.openxmlformats.org/officeDocument/2006/relationships" xmlns:p="http://schemas.openxmlformats.org/presentationml/2006/main">
+  <p:cSld>
+    <p:spTree>
+      <p:nvGrpSpPr>
+        <p:cNvPr id="1" name=""/>
+        <p:cNvGrpSpPr/>
+        <p:nvPr/>
+      </p:nvGrpSpPr>
+      <p:grpSpPr>
+        <a:xfrm>
+          <a:off x="0" y="0"/>
+          <a:ext cx="0" cy="0"/>
+          <a:chOff x="0" y="0"/>
+          <a:chExt cx="0" cy="0"/>
+        </a:xfrm>
+      </p:grpSpPr>
+      <p:sp>
+        <p:nvSpPr>
+          <p:cNvPr id="2" name="Title 1"/>
+          <p:cNvSpPr>
+            <a:spLocks noGrp="1"/>
+          </p:cNvSpPr>
+          <p:nvPr>
+            <p:ph type="title"/>
+          </p:nvPr>
+        </p:nvSpPr>
+        <p:spPr>
+          <a:xfrm>
+            <a:off x="450453" y="52710"/>
+            <a:ext cx="8596668" cy="559182"/>
+          </a:xfrm>
+        </p:spPr>
+        <p:txBody>
+          <a:bodyPr>
+            <a:normAutofit fontScale="90000"/>
+          </a:bodyPr>
+          <a:lstStyle/>
+          <a:p>
+            <a:r>
+              <a:rPr lang="en-GB" dirty="0" smtClean="0"/>
+              <a:t>Abstract Classes</a:t>
+            </a:r>
+            <a:endParaRPr lang="en-GB" dirty="0"/>
+          </a:p>
+        </p:txBody>
+      </p:sp>
+      <p:sp>
+        <p:nvSpPr>
+          <p:cNvPr id="3" name="Content Placeholder 2"/>
+          <p:cNvSpPr>
+            <a:spLocks noGrp="1"/>
+          </p:cNvSpPr>
+          <p:nvPr>
+            <p:ph idx="1"/>
+          </p:nvPr>
+        </p:nvSpPr>
+        <p:spPr>
+          <a:xfrm>
+            <a:off x="677334" y="611892"/>
+            <a:ext cx="8989180" cy="5740781"/>
+          </a:xfrm>
+        </p:spPr>
+        <p:txBody>
+          <a:bodyPr>
+            <a:normAutofit/>
+          </a:bodyPr>
+          <a:lstStyle/>
+          <a:p>
+            <a:r>
+              <a:rPr lang="en-GB" sz="1400" dirty="0" smtClean="0"/>
+              <a:t>Abstract classes cannot be instantiated they can only be inherited.</a:t>
+            </a:r>
+          </a:p>
+          <a:p>
+            <a:r>
+              <a:rPr lang="en-GB" sz="1400" dirty="0" smtClean="0"/>
+              <a:t>We use abstract keyword to create abstract classes.</a:t>
+            </a:r>
+          </a:p>
+          <a:p>
+            <a:r>
+              <a:rPr lang="en-GB" sz="1400" dirty="0" smtClean="0"/>
+              <a:t>We also have abstract methods  which just give method signature no definition and thus skip the  { }.</a:t>
+            </a:r>
+          </a:p>
+          <a:p>
+            <a:r>
+              <a:rPr lang="en-GB" sz="1400" dirty="0" smtClean="0"/>
+              <a:t>Whenever we extend from a abstract class we need to implement its abstract methods by providing implementation logic.</a:t>
+            </a:r>
+            <a:endParaRPr lang="en-GB" sz="1400" dirty="0"/>
+          </a:p>
+        </p:txBody>
+      </p:sp>
+      <p:pic>
+        <p:nvPicPr>
+          <p:cNvPr id="4" name="Picture 3"/>
+          <p:cNvPicPr>
+            <a:picLocks noChangeAspect="1"/>
+          </p:cNvPicPr>
+          <p:nvPr/>
+        </p:nvPicPr>
+        <p:blipFill>
+          <a:blip r:embed="rId2"/>
+          <a:stretch>
+            <a:fillRect/>
+          </a:stretch>
+        </p:blipFill>
+        <p:spPr>
+          <a:xfrm>
+            <a:off x="686117" y="2215177"/>
+            <a:ext cx="8709356" cy="4162333"/>
+          </a:xfrm>
+          <a:prstGeom prst="rect">
+            <a:avLst/>
+          </a:prstGeom>
+        </p:spPr>
+      </p:pic>
+    </p:spTree>
+    <p:extLst>
+      <p:ext uri="{BB962C8B-B14F-4D97-AF65-F5344CB8AC3E}">
+        <p14:creationId xmlns:p14="http://schemas.microsoft.com/office/powerpoint/2010/main" val="3621367444"/>
+      </p:ext>
+    </p:extLst>
+  </p:cSld>
+  <p:clrMapOvr>
+    <a:masterClrMapping/>
+  </p:clrMapOvr>
+</p:sld>
+</file>
+
+<file path=ppt/slides/slide26.xml><?xml version="1.0" encoding="utf-8"?>
+<p:sld xmlns:a="http://schemas.openxmlformats.org/drawingml/2006/main" xmlns:r="http://schemas.openxmlformats.org/officeDocument/2006/relationships" xmlns:p="http://schemas.openxmlformats.org/presentationml/2006/main">
+  <p:cSld>
+    <p:spTree>
+      <p:nvGrpSpPr>
+        <p:cNvPr id="1" name=""/>
+        <p:cNvGrpSpPr/>
+        <p:nvPr/>
+      </p:nvGrpSpPr>
+      <p:grpSpPr>
+        <a:xfrm>
+          <a:off x="0" y="0"/>
+          <a:ext cx="0" cy="0"/>
+          <a:chOff x="0" y="0"/>
+          <a:chExt cx="0" cy="0"/>
+        </a:xfrm>
+      </p:grpSpPr>
+      <p:sp>
+        <p:nvSpPr>
+          <p:cNvPr id="2" name="Title 1"/>
+          <p:cNvSpPr>
+            <a:spLocks noGrp="1"/>
+          </p:cNvSpPr>
+          <p:nvPr>
+            <p:ph type="title"/>
+          </p:nvPr>
+        </p:nvSpPr>
+        <p:spPr>
+          <a:xfrm>
+            <a:off x="409202" y="80211"/>
+            <a:ext cx="8596668" cy="497305"/>
+          </a:xfrm>
+        </p:spPr>
+        <p:txBody>
+          <a:bodyPr>
+            <a:normAutofit/>
+          </a:bodyPr>
+          <a:lstStyle/>
+          <a:p>
+            <a:r>
+              <a:rPr lang="en-IN" sz="2000" dirty="0"/>
+              <a:t>Private Constructors &amp; Singletons (added with </a:t>
+            </a:r>
+            <a:r>
+              <a:rPr lang="en-IN" sz="2000" dirty="0" err="1"/>
+              <a:t>TypeScript</a:t>
+            </a:r>
+            <a:r>
+              <a:rPr lang="en-IN" sz="2000" dirty="0"/>
+              <a:t> 2.0)</a:t>
+            </a:r>
+            <a:endParaRPr lang="en-GB" sz="2000" dirty="0"/>
+          </a:p>
+        </p:txBody>
+      </p:sp>
+      <p:sp>
+        <p:nvSpPr>
+          <p:cNvPr id="3" name="Content Placeholder 2"/>
+          <p:cNvSpPr>
+            <a:spLocks noGrp="1"/>
+          </p:cNvSpPr>
+          <p:nvPr>
+            <p:ph idx="1"/>
+          </p:nvPr>
+        </p:nvSpPr>
+        <p:spPr>
+          <a:xfrm>
+            <a:off x="677334" y="495015"/>
+            <a:ext cx="8596668" cy="5546348"/>
+          </a:xfrm>
+        </p:spPr>
+        <p:txBody>
+          <a:bodyPr/>
+          <a:lstStyle/>
+          <a:p>
+            <a:r>
+              <a:rPr lang="en-IN" dirty="0" smtClean="0"/>
+              <a:t>Type script offers private constructors to create singleton instances of a class.</a:t>
+            </a:r>
+          </a:p>
+          <a:p>
+            <a:r>
+              <a:rPr lang="en-IN" dirty="0" smtClean="0"/>
+              <a:t>Such classes cant be instantiated from outside. It exposes a static method that always returns the same instance of the class.</a:t>
+            </a:r>
+          </a:p>
+          <a:p>
+            <a:endParaRPr lang="en-GB" dirty="0"/>
+          </a:p>
+        </p:txBody>
+      </p:sp>
+      <p:pic>
+        <p:nvPicPr>
+          <p:cNvPr id="4" name="Picture 3"/>
+          <p:cNvPicPr>
+            <a:picLocks noChangeAspect="1"/>
+          </p:cNvPicPr>
+          <p:nvPr/>
+        </p:nvPicPr>
+        <p:blipFill>
+          <a:blip r:embed="rId2"/>
+          <a:stretch>
+            <a:fillRect/>
+          </a:stretch>
+        </p:blipFill>
+        <p:spPr>
+          <a:xfrm>
+            <a:off x="1272769" y="1626124"/>
+            <a:ext cx="7527472" cy="4135283"/>
+          </a:xfrm>
+          <a:prstGeom prst="rect">
+            <a:avLst/>
+          </a:prstGeom>
+        </p:spPr>
+      </p:pic>
+    </p:spTree>
+    <p:extLst>
+      <p:ext uri="{BB962C8B-B14F-4D97-AF65-F5344CB8AC3E}">
+        <p14:creationId xmlns:p14="http://schemas.microsoft.com/office/powerpoint/2010/main" val="3000486655"/>
+      </p:ext>
+    </p:extLst>
+  </p:cSld>
+  <p:clrMapOvr>
+    <a:masterClrMapping/>
+  </p:clrMapOvr>
+</p:sld>
+</file>
+
+<file path=ppt/slides/slide27.xml><?xml version="1.0" encoding="utf-8"?>
+<p:sld xmlns:a="http://schemas.openxmlformats.org/drawingml/2006/main" xmlns:r="http://schemas.openxmlformats.org/officeDocument/2006/relationships" xmlns:p="http://schemas.openxmlformats.org/presentationml/2006/main">
+  <p:cSld>
+    <p:spTree>
+      <p:nvGrpSpPr>
+        <p:cNvPr id="1" name=""/>
+        <p:cNvGrpSpPr/>
+        <p:nvPr/>
+      </p:nvGrpSpPr>
+      <p:grpSpPr>
+        <a:xfrm>
+          <a:off x="0" y="0"/>
+          <a:ext cx="0" cy="0"/>
+          <a:chOff x="0" y="0"/>
+          <a:chExt cx="0" cy="0"/>
+        </a:xfrm>
+      </p:grpSpPr>
+      <p:sp>
+        <p:nvSpPr>
+          <p:cNvPr id="2" name="Title 1"/>
+          <p:cNvSpPr>
+            <a:spLocks noGrp="1"/>
+          </p:cNvSpPr>
+          <p:nvPr>
+            <p:ph type="title"/>
+          </p:nvPr>
+        </p:nvSpPr>
+        <p:spPr>
+          <a:xfrm>
+            <a:off x="677334" y="138332"/>
+            <a:ext cx="8596668" cy="438443"/>
+          </a:xfrm>
+        </p:spPr>
+        <p:txBody>
+          <a:bodyPr>
+            <a:normAutofit/>
+          </a:bodyPr>
+          <a:lstStyle/>
+          <a:p>
+            <a:r>
+              <a:rPr lang="en-IN" sz="2000" dirty="0">
+                <a:latin typeface="Verdana" panose="020B0604030504040204" pitchFamily="34" charset="0"/>
+                <a:ea typeface="Verdana" panose="020B0604030504040204" pitchFamily="34" charset="0"/>
+              </a:rPr>
+              <a:t>"</a:t>
+            </a:r>
+            <a:r>
+              <a:rPr lang="en-IN" sz="2000" dirty="0" err="1">
+                <a:latin typeface="Verdana" panose="020B0604030504040204" pitchFamily="34" charset="0"/>
+                <a:ea typeface="Verdana" panose="020B0604030504040204" pitchFamily="34" charset="0"/>
+              </a:rPr>
+              <a:t>readonly</a:t>
+            </a:r>
+            <a:r>
+              <a:rPr lang="en-IN" sz="2000" dirty="0">
+                <a:latin typeface="Verdana" panose="020B0604030504040204" pitchFamily="34" charset="0"/>
+                <a:ea typeface="Verdana" panose="020B0604030504040204" pitchFamily="34" charset="0"/>
+              </a:rPr>
+              <a:t>" Properties (added with </a:t>
+            </a:r>
+            <a:r>
+              <a:rPr lang="en-IN" sz="2000" dirty="0" err="1">
+                <a:latin typeface="Verdana" panose="020B0604030504040204" pitchFamily="34" charset="0"/>
+                <a:ea typeface="Verdana" panose="020B0604030504040204" pitchFamily="34" charset="0"/>
+              </a:rPr>
+              <a:t>TypeScript</a:t>
+            </a:r>
+            <a:r>
+              <a:rPr lang="en-IN" sz="2000" dirty="0">
+                <a:latin typeface="Verdana" panose="020B0604030504040204" pitchFamily="34" charset="0"/>
+                <a:ea typeface="Verdana" panose="020B0604030504040204" pitchFamily="34" charset="0"/>
+              </a:rPr>
+              <a:t> 2.0)</a:t>
+            </a:r>
+            <a:endParaRPr lang="en-GB" sz="2000" dirty="0">
+              <a:latin typeface="Verdana" panose="020B0604030504040204" pitchFamily="34" charset="0"/>
+              <a:ea typeface="Verdana" panose="020B0604030504040204" pitchFamily="34" charset="0"/>
+            </a:endParaRPr>
+          </a:p>
+        </p:txBody>
+      </p:sp>
+      <p:sp>
+        <p:nvSpPr>
+          <p:cNvPr id="3" name="Content Placeholder 2"/>
+          <p:cNvSpPr>
+            <a:spLocks noGrp="1"/>
+          </p:cNvSpPr>
+          <p:nvPr>
+            <p:ph idx="1"/>
+          </p:nvPr>
+        </p:nvSpPr>
+        <p:spPr>
+          <a:xfrm>
+            <a:off x="677334" y="576775"/>
+            <a:ext cx="8596668" cy="5739619"/>
+          </a:xfrm>
+        </p:spPr>
+        <p:txBody>
+          <a:bodyPr/>
+          <a:lstStyle/>
+          <a:p>
+            <a:r>
+              <a:rPr lang="en-IN" dirty="0" smtClean="0"/>
+              <a:t>There are multiple ways to create a </a:t>
+            </a:r>
+            <a:r>
+              <a:rPr lang="en-IN" dirty="0" err="1" smtClean="0"/>
+              <a:t>readonly</a:t>
+            </a:r>
+            <a:r>
+              <a:rPr lang="en-IN" dirty="0" smtClean="0"/>
+              <a:t> property in </a:t>
+            </a:r>
+            <a:r>
+              <a:rPr lang="en-IN" dirty="0" err="1" smtClean="0"/>
+              <a:t>Ts</a:t>
+            </a:r>
+            <a:r>
+              <a:rPr lang="en-IN" dirty="0" smtClean="0"/>
+              <a:t>.</a:t>
+            </a:r>
+          </a:p>
+          <a:p>
+            <a:r>
+              <a:rPr lang="en-IN" dirty="0" smtClean="0"/>
+              <a:t>One way is to create a private property assign a value and create only a getter not the setter.</a:t>
+            </a:r>
+          </a:p>
+          <a:p>
+            <a:r>
+              <a:rPr lang="en-IN" dirty="0" smtClean="0"/>
+              <a:t>Another shorter way is to add </a:t>
+            </a:r>
+            <a:r>
+              <a:rPr lang="en-IN" dirty="0" err="1" smtClean="0"/>
+              <a:t>readonly</a:t>
+            </a:r>
+            <a:r>
+              <a:rPr lang="en-IN" dirty="0" smtClean="0"/>
+              <a:t> keyword to property declaration.</a:t>
+            </a:r>
+          </a:p>
+          <a:p>
+            <a:r>
+              <a:rPr lang="en-IN" dirty="0" smtClean="0"/>
+              <a:t>Demo using branch </a:t>
+            </a:r>
+            <a:r>
+              <a:rPr lang="en-GB" dirty="0" smtClean="0">
+                <a:hlinkClick r:id="rId2"/>
+              </a:rPr>
+              <a:t>classes-basics</a:t>
+            </a:r>
+            <a:endParaRPr lang="en-GB" dirty="0" smtClean="0"/>
+          </a:p>
+          <a:p>
+            <a:pPr marL="0" indent="0">
+              <a:buNone/>
+            </a:pPr>
+            <a:endParaRPr lang="en-IN" dirty="0" smtClean="0"/>
+          </a:p>
+          <a:p>
+            <a:endParaRPr lang="en-GB" dirty="0"/>
+          </a:p>
+        </p:txBody>
+      </p:sp>
+      <p:pic>
+        <p:nvPicPr>
+          <p:cNvPr id="9" name="Picture 8"/>
+          <p:cNvPicPr>
+            <a:picLocks noChangeAspect="1"/>
+          </p:cNvPicPr>
+          <p:nvPr/>
+        </p:nvPicPr>
+        <p:blipFill>
+          <a:blip r:embed="rId3"/>
+          <a:stretch>
+            <a:fillRect/>
+          </a:stretch>
+        </p:blipFill>
+        <p:spPr>
+          <a:xfrm>
+            <a:off x="894031" y="2569258"/>
+            <a:ext cx="7982683" cy="2980446"/>
+          </a:xfrm>
+          <a:prstGeom prst="rect">
+            <a:avLst/>
+          </a:prstGeom>
+        </p:spPr>
+      </p:pic>
+    </p:spTree>
+    <p:extLst>
+      <p:ext uri="{BB962C8B-B14F-4D97-AF65-F5344CB8AC3E}">
+        <p14:creationId xmlns:p14="http://schemas.microsoft.com/office/powerpoint/2010/main" val="2741619418"/>
+      </p:ext>
+    </p:extLst>
+  </p:cSld>
+  <p:clrMapOvr>
+    <a:masterClrMapping/>
+  </p:clrMapOvr>
+  <p:timing>
+    <p:tnLst>
+      <p:par>
+        <p:cTn id="1" dur="indefinite" restart="never" nodeType="tmRoot"/>
+      </p:par>
+    </p:tnLst>
+  </p:timing>
+</p:sld>
+</file>
+
+<file path=ppt/slides/slide28.xml><?xml version="1.0" encoding="utf-8"?>
+<p:sld xmlns:a="http://schemas.openxmlformats.org/drawingml/2006/main" xmlns:r="http://schemas.openxmlformats.org/officeDocument/2006/relationships" xmlns:p="http://schemas.openxmlformats.org/presentationml/2006/main">
+  <p:cSld>
+    <p:spTree>
+      <p:nvGrpSpPr>
+        <p:cNvPr id="1" name=""/>
+        <p:cNvGrpSpPr/>
+        <p:nvPr/>
+      </p:nvGrpSpPr>
+      <p:grpSpPr>
+        <a:xfrm>
+          <a:off x="0" y="0"/>
+          <a:ext cx="0" cy="0"/>
+          <a:chOff x="0" y="0"/>
+          <a:chExt cx="0" cy="0"/>
+        </a:xfrm>
+      </p:grpSpPr>
+      <p:sp>
+        <p:nvSpPr>
+          <p:cNvPr id="3" name="Content Placeholder 2"/>
+          <p:cNvSpPr>
+            <a:spLocks noGrp="1"/>
+          </p:cNvSpPr>
+          <p:nvPr>
+            <p:ph idx="1"/>
+          </p:nvPr>
+        </p:nvSpPr>
+        <p:spPr>
+          <a:xfrm>
+            <a:off x="3163860" y="2754147"/>
+            <a:ext cx="8596668" cy="3880773"/>
+          </a:xfrm>
+        </p:spPr>
+        <p:txBody>
+          <a:bodyPr>
+            <a:normAutofit/>
+          </a:bodyPr>
+          <a:lstStyle/>
+          <a:p>
+            <a:pPr marL="0" indent="0">
+              <a:buNone/>
+            </a:pPr>
+            <a:r>
+              <a:rPr lang="en-IN" sz="5400" b="1" smtClean="0"/>
+              <a:t>Thanks!!!!!</a:t>
+            </a:r>
+            <a:endParaRPr lang="en-GB" sz="5400" b="1" dirty="0"/>
+          </a:p>
+        </p:txBody>
+      </p:sp>
+    </p:spTree>
+    <p:extLst>
+      <p:ext uri="{BB962C8B-B14F-4D97-AF65-F5344CB8AC3E}">
+        <p14:creationId xmlns:p14="http://schemas.microsoft.com/office/powerpoint/2010/main" val="3977684842"/>
       </p:ext>
     </p:extLst>
   </p:cSld>

</xml_diff>